<commit_message>
Added the presentation slides , visualizations , finished the notebook
</commit_message>
<xml_diff>
--- a/presentation.pptx
+++ b/presentation.pptx
@@ -12553,9 +12553,18 @@
   <p:clrMapOvr>
     <a:masterClrMapping/>
   </p:clrMapOvr>
-  <p:transition spd="med">
-    <p:randomBar dir="vert"/>
-  </p:transition>
+  <mc:AlternateContent xmlns:mc="http://schemas.openxmlformats.org/markup-compatibility/2006">
+    <mc:Choice xmlns:p14="http://schemas.microsoft.com/office/powerpoint/2010/main" Requires="p14">
+      <p:transition spd="slow" p14:dur="4000" advTm="800">
+        <p14:vortex dir="r"/>
+      </p:transition>
+    </mc:Choice>
+    <mc:Fallback>
+      <p:transition spd="slow" advTm="800">
+        <p:fade/>
+      </p:transition>
+    </mc:Fallback>
+  </mc:AlternateContent>
   <p:timing>
     <p:tnLst>
       <p:par>
@@ -12730,9 +12739,18 @@
   <p:clrMapOvr>
     <a:masterClrMapping/>
   </p:clrMapOvr>
-  <p:transition spd="med">
-    <p:randomBar dir="vert"/>
-  </p:transition>
+  <mc:AlternateContent xmlns:mc="http://schemas.openxmlformats.org/markup-compatibility/2006">
+    <mc:Choice xmlns:p14="http://schemas.microsoft.com/office/powerpoint/2010/main" Requires="p14">
+      <p:transition spd="slow" p14:dur="4000" advTm="800">
+        <p14:vortex dir="r"/>
+      </p:transition>
+    </mc:Choice>
+    <mc:Fallback>
+      <p:transition spd="slow" advTm="800">
+        <p:fade/>
+      </p:transition>
+    </mc:Fallback>
+  </mc:AlternateContent>
   <p:timing>
     <p:tnLst>
       <p:par>
@@ -12917,9 +12935,18 @@
   <p:clrMapOvr>
     <a:masterClrMapping/>
   </p:clrMapOvr>
-  <p:transition spd="med">
-    <p:randomBar dir="vert"/>
-  </p:transition>
+  <mc:AlternateContent xmlns:mc="http://schemas.openxmlformats.org/markup-compatibility/2006">
+    <mc:Choice xmlns:p14="http://schemas.microsoft.com/office/powerpoint/2010/main" Requires="p14">
+      <p:transition spd="slow" p14:dur="4000" advTm="800">
+        <p14:vortex dir="r"/>
+      </p:transition>
+    </mc:Choice>
+    <mc:Fallback>
+      <p:transition spd="slow" advTm="800">
+        <p:fade/>
+      </p:transition>
+    </mc:Fallback>
+  </mc:AlternateContent>
   <p:timing>
     <p:tnLst>
       <p:par>
@@ -13115,9 +13142,18 @@
   <p:clrMapOvr>
     <a:masterClrMapping/>
   </p:clrMapOvr>
-  <p:transition spd="med">
-    <p:randomBar dir="vert"/>
-  </p:transition>
+  <mc:AlternateContent xmlns:mc="http://schemas.openxmlformats.org/markup-compatibility/2006">
+    <mc:Choice xmlns:p14="http://schemas.microsoft.com/office/powerpoint/2010/main" Requires="p14">
+      <p:transition spd="slow" p14:dur="4000" advTm="800">
+        <p14:vortex dir="r"/>
+      </p:transition>
+    </mc:Choice>
+    <mc:Fallback>
+      <p:transition spd="slow" advTm="800">
+        <p:fade/>
+      </p:transition>
+    </mc:Fallback>
+  </mc:AlternateContent>
   <p:timing>
     <p:tnLst>
       <p:par>
@@ -13336,9 +13372,18 @@
   <p:clrMapOvr>
     <a:masterClrMapping/>
   </p:clrMapOvr>
-  <p:transition spd="med">
-    <p:randomBar dir="vert"/>
-  </p:transition>
+  <mc:AlternateContent xmlns:mc="http://schemas.openxmlformats.org/markup-compatibility/2006">
+    <mc:Choice xmlns:p14="http://schemas.microsoft.com/office/powerpoint/2010/main" Requires="p14">
+      <p:transition spd="slow" p14:dur="4000" advTm="800">
+        <p14:vortex dir="r"/>
+      </p:transition>
+    </mc:Choice>
+    <mc:Fallback>
+      <p:transition spd="slow" advTm="800">
+        <p:fade/>
+      </p:transition>
+    </mc:Fallback>
+  </mc:AlternateContent>
   <p:timing>
     <p:tnLst>
       <p:par>
@@ -13640,9 +13685,18 @@
   <p:clrMapOvr>
     <a:masterClrMapping/>
   </p:clrMapOvr>
-  <p:transition spd="med">
-    <p:randomBar dir="vert"/>
-  </p:transition>
+  <mc:AlternateContent xmlns:mc="http://schemas.openxmlformats.org/markup-compatibility/2006">
+    <mc:Choice xmlns:p14="http://schemas.microsoft.com/office/powerpoint/2010/main" Requires="p14">
+      <p:transition spd="slow" p14:dur="4000" advTm="800">
+        <p14:vortex dir="r"/>
+      </p:transition>
+    </mc:Choice>
+    <mc:Fallback>
+      <p:transition spd="slow" advTm="800">
+        <p:fade/>
+      </p:transition>
+    </mc:Fallback>
+  </mc:AlternateContent>
   <p:timing>
     <p:tnLst>
       <p:par>
@@ -14090,9 +14144,18 @@
   <p:clrMapOvr>
     <a:masterClrMapping/>
   </p:clrMapOvr>
-  <p:transition spd="med">
-    <p:randomBar dir="vert"/>
-  </p:transition>
+  <mc:AlternateContent xmlns:mc="http://schemas.openxmlformats.org/markup-compatibility/2006">
+    <mc:Choice xmlns:p14="http://schemas.microsoft.com/office/powerpoint/2010/main" Requires="p14">
+      <p:transition spd="slow" p14:dur="4000" advTm="800">
+        <p14:vortex dir="r"/>
+      </p:transition>
+    </mc:Choice>
+    <mc:Fallback>
+      <p:transition spd="slow" advTm="800">
+        <p:fade/>
+      </p:transition>
+    </mc:Fallback>
+  </mc:AlternateContent>
   <p:timing>
     <p:tnLst>
       <p:par>
@@ -14220,9 +14283,18 @@
   <p:clrMapOvr>
     <a:masterClrMapping/>
   </p:clrMapOvr>
-  <p:transition spd="med">
-    <p:randomBar dir="vert"/>
-  </p:transition>
+  <mc:AlternateContent xmlns:mc="http://schemas.openxmlformats.org/markup-compatibility/2006">
+    <mc:Choice xmlns:p14="http://schemas.microsoft.com/office/powerpoint/2010/main" Requires="p14">
+      <p:transition spd="slow" p14:dur="4000" advTm="800">
+        <p14:vortex dir="r"/>
+      </p:transition>
+    </mc:Choice>
+    <mc:Fallback>
+      <p:transition spd="slow" advTm="800">
+        <p:fade/>
+      </p:transition>
+    </mc:Fallback>
+  </mc:AlternateContent>
   <p:timing>
     <p:tnLst>
       <p:par>
@@ -14322,9 +14394,18 @@
   <p:clrMapOvr>
     <a:masterClrMapping/>
   </p:clrMapOvr>
-  <p:transition spd="med">
-    <p:randomBar dir="vert"/>
-  </p:transition>
+  <mc:AlternateContent xmlns:mc="http://schemas.openxmlformats.org/markup-compatibility/2006">
+    <mc:Choice xmlns:p14="http://schemas.microsoft.com/office/powerpoint/2010/main" Requires="p14">
+      <p:transition spd="slow" p14:dur="4000" advTm="800">
+        <p14:vortex dir="r"/>
+      </p:transition>
+    </mc:Choice>
+    <mc:Fallback>
+      <p:transition spd="slow" advTm="800">
+        <p:fade/>
+      </p:transition>
+    </mc:Fallback>
+  </mc:AlternateContent>
   <p:timing>
     <p:tnLst>
       <p:par>
@@ -14618,9 +14699,18 @@
   <p:clrMapOvr>
     <a:masterClrMapping/>
   </p:clrMapOvr>
-  <p:transition spd="med">
-    <p:randomBar dir="vert"/>
-  </p:transition>
+  <mc:AlternateContent xmlns:mc="http://schemas.openxmlformats.org/markup-compatibility/2006">
+    <mc:Choice xmlns:p14="http://schemas.microsoft.com/office/powerpoint/2010/main" Requires="p14">
+      <p:transition spd="slow" p14:dur="4000" advTm="800">
+        <p14:vortex dir="r"/>
+      </p:transition>
+    </mc:Choice>
+    <mc:Fallback>
+      <p:transition spd="slow" advTm="800">
+        <p:fade/>
+      </p:transition>
+    </mc:Fallback>
+  </mc:AlternateContent>
   <p:timing>
     <p:tnLst>
       <p:par>
@@ -14892,9 +14982,18 @@
   <p:clrMapOvr>
     <a:masterClrMapping/>
   </p:clrMapOvr>
-  <p:transition spd="med">
-    <p:randomBar dir="vert"/>
-  </p:transition>
+  <mc:AlternateContent xmlns:mc="http://schemas.openxmlformats.org/markup-compatibility/2006">
+    <mc:Choice xmlns:p14="http://schemas.microsoft.com/office/powerpoint/2010/main" Requires="p14">
+      <p:transition spd="slow" p14:dur="4000" advTm="800">
+        <p14:vortex dir="r"/>
+      </p:transition>
+    </mc:Choice>
+    <mc:Fallback>
+      <p:transition spd="slow" advTm="800">
+        <p:fade/>
+      </p:transition>
+    </mc:Fallback>
+  </mc:AlternateContent>
   <p:timing>
     <p:tnLst>
       <p:par>
@@ -15183,9 +15282,18 @@
     <p:sldLayoutId id="2147483982" r:id="rId10"/>
     <p:sldLayoutId id="2147483983" r:id="rId11"/>
   </p:sldLayoutIdLst>
-  <p:transition spd="med">
-    <p:randomBar dir="vert"/>
-  </p:transition>
+  <mc:AlternateContent xmlns:mc="http://schemas.openxmlformats.org/markup-compatibility/2006">
+    <mc:Choice xmlns:p14="http://schemas.microsoft.com/office/powerpoint/2010/main" Requires="p14">
+      <p:transition spd="slow" p14:dur="4000" advTm="800">
+        <p14:vortex dir="r"/>
+      </p:transition>
+    </mc:Choice>
+    <mc:Fallback>
+      <p:transition spd="slow" advTm="800">
+        <p:fade/>
+      </p:transition>
+    </mc:Fallback>
+  </mc:AlternateContent>
   <p:timing>
     <p:tnLst>
       <p:par>
@@ -15570,9 +15678,18 @@
   <p:clrMapOvr>
     <a:masterClrMapping/>
   </p:clrMapOvr>
-  <p:transition spd="med">
-    <p:randomBar dir="vert"/>
-  </p:transition>
+  <mc:AlternateContent xmlns:mc="http://schemas.openxmlformats.org/markup-compatibility/2006">
+    <mc:Choice xmlns:p14="http://schemas.microsoft.com/office/powerpoint/2010/main" Requires="p14">
+      <p:transition spd="slow" p14:dur="3000" advTm="2800">
+        <p14:vortex dir="r"/>
+      </p:transition>
+    </mc:Choice>
+    <mc:Fallback>
+      <p:transition spd="slow" advTm="2800">
+        <p:fade/>
+      </p:transition>
+    </mc:Fallback>
+  </mc:AlternateContent>
   <p:timing>
     <p:tnLst>
       <p:par>
@@ -15699,13 +15816,13 @@
   </p:clrMapOvr>
   <mc:AlternateContent xmlns:mc="http://schemas.openxmlformats.org/markup-compatibility/2006">
     <mc:Choice xmlns:p14="http://schemas.microsoft.com/office/powerpoint/2010/main" Requires="p14">
-      <p:transition spd="slow" p14:dur="4400">
-        <p14:honeycomb/>
+      <p:transition spd="slow" p14:dur="1200" advTm="8800">
+        <p:dissolve/>
       </p:transition>
     </mc:Choice>
     <mc:Fallback>
-      <p:transition spd="slow">
-        <p:fade/>
+      <p:transition spd="slow" advTm="8800">
+        <p:dissolve/>
       </p:transition>
     </mc:Fallback>
   </mc:AlternateContent>
@@ -15746,10 +15863,15 @@
             <p:ph sz="half" idx="1"/>
           </p:nvPr>
         </p:nvSpPr>
-        <p:spPr/>
+        <p:spPr>
+          <a:xfrm>
+            <a:off x="140494" y="3408362"/>
+            <a:ext cx="3124200" cy="3297237"/>
+          </a:xfrm>
+        </p:spPr>
         <p:txBody>
           <a:bodyPr>
-            <a:normAutofit/>
+            <a:normAutofit fontScale="92500" lnSpcReduction="10000"/>
           </a:bodyPr>
           <a:lstStyle/>
           <a:p>
@@ -15782,7 +15904,19 @@
                   </a:schemeClr>
                 </a:solidFill>
               </a:rPr>
-              <a:t>Check me out on linked in @</a:t>
+              <a:t>Check me out on :</a:t>
+            </a:r>
+          </a:p>
+          <a:p>
+            <a:r>
+              <a:rPr lang="en-US" sz="2000" b="1" dirty="0" smtClean="0">
+                <a:solidFill>
+                  <a:schemeClr val="accent3">
+                    <a:lumMod val="75000"/>
+                  </a:schemeClr>
+                </a:solidFill>
+              </a:rPr>
+              <a:t>linked in @</a:t>
             </a:r>
             <a:r>
               <a:rPr lang="en-US" sz="2000" b="1" dirty="0" err="1" smtClean="0">
@@ -15793,6 +15927,93 @@
                 </a:solidFill>
               </a:rPr>
               <a:t>SenseiKarani</a:t>
+            </a:r>
+            <a:endParaRPr lang="en-US" sz="2000" b="1" dirty="0" smtClean="0">
+              <a:solidFill>
+                <a:schemeClr val="accent3">
+                  <a:lumMod val="75000"/>
+                </a:schemeClr>
+              </a:solidFill>
+            </a:endParaRPr>
+          </a:p>
+          <a:p>
+            <a:r>
+              <a:rPr lang="en-US" sz="2000" b="1" dirty="0" err="1" smtClean="0">
+                <a:solidFill>
+                  <a:schemeClr val="accent3">
+                    <a:lumMod val="75000"/>
+                  </a:schemeClr>
+                </a:solidFill>
+              </a:rPr>
+              <a:t>Github</a:t>
+            </a:r>
+            <a:r>
+              <a:rPr lang="en-US" sz="2000" b="1" dirty="0" smtClean="0">
+                <a:solidFill>
+                  <a:schemeClr val="accent3">
+                    <a:lumMod val="75000"/>
+                  </a:schemeClr>
+                </a:solidFill>
+              </a:rPr>
+              <a:t> : </a:t>
+            </a:r>
+            <a:r>
+              <a:rPr lang="en-US" sz="2000" b="1" dirty="0" err="1" smtClean="0">
+                <a:solidFill>
+                  <a:schemeClr val="accent3">
+                    <a:lumMod val="75000"/>
+                  </a:schemeClr>
+                </a:solidFill>
+              </a:rPr>
+              <a:t>ianmwarimu</a:t>
+            </a:r>
+            <a:endParaRPr lang="en-US" sz="2000" b="1" dirty="0" smtClean="0">
+              <a:solidFill>
+                <a:schemeClr val="accent3">
+                  <a:lumMod val="75000"/>
+                </a:schemeClr>
+              </a:solidFill>
+            </a:endParaRPr>
+          </a:p>
+          <a:p>
+            <a:r>
+              <a:rPr lang="en-US" sz="2000" b="1" dirty="0" smtClean="0">
+                <a:solidFill>
+                  <a:schemeClr val="accent3">
+                    <a:lumMod val="75000"/>
+                  </a:schemeClr>
+                </a:solidFill>
+              </a:rPr>
+              <a:t>X : </a:t>
+            </a:r>
+            <a:r>
+              <a:rPr lang="en-US" sz="2000" b="1" dirty="0" err="1" smtClean="0">
+                <a:solidFill>
+                  <a:schemeClr val="accent3">
+                    <a:lumMod val="75000"/>
+                  </a:schemeClr>
+                </a:solidFill>
+              </a:rPr>
+              <a:t>senseiKarani</a:t>
+            </a:r>
+            <a:endParaRPr lang="en-US" sz="2000" b="1" dirty="0" smtClean="0">
+              <a:solidFill>
+                <a:schemeClr val="accent3">
+                  <a:lumMod val="75000"/>
+                </a:schemeClr>
+              </a:solidFill>
+            </a:endParaRPr>
+          </a:p>
+          <a:p>
+            <a:r>
+              <a:rPr lang="en-US" sz="2000" b="1" dirty="0" smtClean="0">
+                <a:solidFill>
+                  <a:schemeClr val="accent3">
+                    <a:lumMod val="75000"/>
+                  </a:schemeClr>
+                </a:solidFill>
+              </a:rPr>
+              <a:t>Tel +254759711993</a:t>
             </a:r>
             <a:endParaRPr lang="en-US" sz="2000" b="1" dirty="0">
               <a:solidFill>
@@ -15828,7 +16049,7 @@
         <p:spPr bwMode="auto">
           <a:xfrm>
             <a:off x="3352800" y="0"/>
-            <a:ext cx="5486400" cy="6400800"/>
+            <a:ext cx="5486400" cy="6629400"/>
           </a:xfrm>
           <a:prstGeom prst="rect">
             <a:avLst/>
@@ -15863,7 +16084,7 @@
         </p:spPr>
         <p:txBody>
           <a:bodyPr>
-            <a:normAutofit/>
+            <a:normAutofit fontScale="92500" lnSpcReduction="10000"/>
           </a:bodyPr>
           <a:lstStyle/>
           <a:p>
@@ -16013,7 +16234,7 @@
         <p:spPr bwMode="auto">
           <a:xfrm>
             <a:off x="781050" y="3484563"/>
-            <a:ext cx="1843088" cy="1819275"/>
+            <a:ext cx="1843088" cy="1392237"/>
           </a:xfrm>
           <a:prstGeom prst="rect">
             <a:avLst/>
@@ -16040,9 +16261,18 @@
   <p:clrMapOvr>
     <a:masterClrMapping/>
   </p:clrMapOvr>
-  <p:transition spd="med">
-    <p:randomBar dir="vert"/>
-  </p:transition>
+  <mc:AlternateContent xmlns:mc="http://schemas.openxmlformats.org/markup-compatibility/2006">
+    <mc:Choice xmlns:p14="http://schemas.microsoft.com/office/powerpoint/2010/main" Requires="p14">
+      <p:transition spd="slow" p14:dur="1600" advTm="17800">
+        <p:blinds dir="vert"/>
+      </p:transition>
+    </mc:Choice>
+    <mc:Fallback>
+      <p:transition spd="slow" advTm="17800">
+        <p:blinds dir="vert"/>
+      </p:transition>
+    </mc:Fallback>
+  </mc:AlternateContent>
   <p:timing>
     <p:tnLst>
       <p:par>
@@ -16303,9 +16533,18 @@
   <p:clrMapOvr>
     <a:masterClrMapping/>
   </p:clrMapOvr>
-  <p:transition spd="med">
-    <p:randomBar dir="vert"/>
-  </p:transition>
+  <mc:AlternateContent xmlns:mc="http://schemas.openxmlformats.org/markup-compatibility/2006">
+    <mc:Choice xmlns:p14="http://schemas.microsoft.com/office/powerpoint/2010/main" Requires="p14">
+      <p:transition spd="slow" p14:dur="2600" advTm="4800">
+        <p:blinds dir="vert"/>
+      </p:transition>
+    </mc:Choice>
+    <mc:Fallback>
+      <p:transition spd="slow" advTm="4800">
+        <p:blinds dir="vert"/>
+      </p:transition>
+    </mc:Fallback>
+  </mc:AlternateContent>
   <p:timing>
     <p:tnLst>
       <p:par>
@@ -16837,9 +17076,18 @@
   <p:clrMapOvr>
     <a:masterClrMapping/>
   </p:clrMapOvr>
-  <p:transition spd="med">
-    <p:randomBar dir="vert"/>
-  </p:transition>
+  <mc:AlternateContent xmlns:mc="http://schemas.openxmlformats.org/markup-compatibility/2006">
+    <mc:Choice xmlns:p14="http://schemas.microsoft.com/office/powerpoint/2010/main" Requires="p14">
+      <p:transition spd="slow" p14:dur="2000" advTm="4800">
+        <p14:ferris dir="l"/>
+      </p:transition>
+    </mc:Choice>
+    <mc:Fallback>
+      <p:transition spd="slow" advTm="4800">
+        <p:fade/>
+      </p:transition>
+    </mc:Fallback>
+  </mc:AlternateContent>
   <p:timing>
     <p:tnLst>
       <p:par>
@@ -17178,8 +17426,8 @@
   <p:clrMapOvr>
     <a:masterClrMapping/>
   </p:clrMapOvr>
-  <p:transition spd="med">
-    <p:randomBar dir="vert"/>
+  <p:transition spd="slow" advTm="4800">
+    <p:wheel spokes="1"/>
   </p:transition>
   <p:timing>
     <p:tnLst>
@@ -17317,12 +17565,12 @@
   </p:clrMapOvr>
   <mc:AlternateContent xmlns:mc="http://schemas.openxmlformats.org/markup-compatibility/2006">
     <mc:Choice xmlns:p14="http://schemas.microsoft.com/office/powerpoint/2010/main" Requires="p14">
-      <p:transition spd="slow" p14:dur="3900">
-        <p14:glitter pattern="hexagon"/>
+      <p:transition spd="slow" p14:dur="1400" advTm="800">
+        <p14:ripple/>
       </p:transition>
     </mc:Choice>
     <mc:Fallback>
-      <p:transition spd="slow">
+      <p:transition spd="slow" advTm="800">
         <p:fade/>
       </p:transition>
     </mc:Fallback>
@@ -17603,9 +17851,18 @@
   <p:clrMapOvr>
     <a:masterClrMapping/>
   </p:clrMapOvr>
-  <p:transition spd="med">
-    <p:randomBar dir="vert"/>
-  </p:transition>
+  <mc:AlternateContent xmlns:mc="http://schemas.openxmlformats.org/markup-compatibility/2006">
+    <mc:Choice xmlns:p14="http://schemas.microsoft.com/office/powerpoint/2010/main" Requires="p14">
+      <p:transition spd="slow" p14:dur="2900" advTm="8800">
+        <p14:warp dir="in"/>
+      </p:transition>
+    </mc:Choice>
+    <mc:Fallback>
+      <p:transition spd="slow" advTm="8800">
+        <p:fade/>
+      </p:transition>
+    </mc:Fallback>
+  </mc:AlternateContent>
   <p:timing>
     <p:tnLst>
       <p:par>
@@ -17716,13 +17973,13 @@
   </p:clrMapOvr>
   <mc:AlternateContent xmlns:mc="http://schemas.openxmlformats.org/markup-compatibility/2006">
     <mc:Choice xmlns:p14="http://schemas.microsoft.com/office/powerpoint/2010/main" Requires="p14">
-      <p:transition spd="slow" p14:dur="1250" advTm="8000">
-        <p:randomBar dir="vert"/>
+      <p:transition spd="slow" p14:dur="1500" advTm="8800">
+        <p14:window dir="vert"/>
       </p:transition>
     </mc:Choice>
     <mc:Fallback>
-      <p:transition spd="slow" advTm="8000">
-        <p:randomBar dir="vert"/>
+      <p:transition spd="slow" advTm="8800">
+        <p:fade/>
       </p:transition>
     </mc:Fallback>
   </mc:AlternateContent>
@@ -17820,7 +18077,7 @@
         <p:spPr>
           <a:xfrm>
             <a:off x="381000" y="1676400"/>
-            <a:ext cx="8763000" cy="4213676"/>
+            <a:ext cx="8382000" cy="4213676"/>
           </a:xfrm>
         </p:spPr>
       </p:pic>
@@ -17834,9 +18091,18 @@
   <p:clrMapOvr>
     <a:masterClrMapping/>
   </p:clrMapOvr>
-  <p:transition spd="med">
-    <p:randomBar dir="vert"/>
-  </p:transition>
+  <mc:AlternateContent xmlns:mc="http://schemas.openxmlformats.org/markup-compatibility/2006">
+    <mc:Choice xmlns:p14="http://schemas.microsoft.com/office/powerpoint/2010/main" Requires="p14">
+      <p:transition spd="slow" p14:dur="3100" advTm="8800">
+        <p14:switch dir="r"/>
+      </p:transition>
+    </mc:Choice>
+    <mc:Fallback>
+      <p:transition spd="slow" advTm="8800">
+        <p:fade/>
+      </p:transition>
+    </mc:Fallback>
+  </mc:AlternateContent>
   <p:timing>
     <p:tnLst>
       <p:par>
@@ -17945,9 +18211,18 @@
   <p:clrMapOvr>
     <a:masterClrMapping/>
   </p:clrMapOvr>
-  <p:transition spd="med">
-    <p:randomBar dir="vert"/>
-  </p:transition>
+  <mc:AlternateContent xmlns:mc="http://schemas.openxmlformats.org/markup-compatibility/2006">
+    <mc:Choice xmlns:p14="http://schemas.microsoft.com/office/powerpoint/2010/main" Requires="p14">
+      <p:transition spd="slow" p14:dur="1500" advTm="7800">
+        <p:checker/>
+      </p:transition>
+    </mc:Choice>
+    <mc:Fallback>
+      <p:transition spd="slow" advTm="7800">
+        <p:checker/>
+      </p:transition>
+    </mc:Fallback>
+  </mc:AlternateContent>
   <p:timing>
     <p:tnLst>
       <p:par>

</xml_diff>